<commit_message>
#86 - update diagrams
</commit_message>
<xml_diff>
--- a/docs/architecture/architecture_overview.pptx
+++ b/docs/architecture/architecture_overview.pptx
@@ -261,7 +261,7 @@
           <a:p>
             <a:fld id="{DDDFC78A-5EB4-44A8-B23F-AC4819FE4B6D}" type="datetimeFigureOut">
               <a:rPr lang="en-CH" smtClean="0"/>
-              <a:t>12/04/2021</a:t>
+              <a:t>13/05/2021</a:t>
             </a:fld>
             <a:endParaRPr lang="en-CH"/>
           </a:p>
@@ -461,7 +461,7 @@
           <a:p>
             <a:fld id="{DDDFC78A-5EB4-44A8-B23F-AC4819FE4B6D}" type="datetimeFigureOut">
               <a:rPr lang="en-CH" smtClean="0"/>
-              <a:t>12/04/2021</a:t>
+              <a:t>13/05/2021</a:t>
             </a:fld>
             <a:endParaRPr lang="en-CH"/>
           </a:p>
@@ -671,7 +671,7 @@
           <a:p>
             <a:fld id="{DDDFC78A-5EB4-44A8-B23F-AC4819FE4B6D}" type="datetimeFigureOut">
               <a:rPr lang="en-CH" smtClean="0"/>
-              <a:t>12/04/2021</a:t>
+              <a:t>13/05/2021</a:t>
             </a:fld>
             <a:endParaRPr lang="en-CH"/>
           </a:p>
@@ -871,7 +871,7 @@
           <a:p>
             <a:fld id="{DDDFC78A-5EB4-44A8-B23F-AC4819FE4B6D}" type="datetimeFigureOut">
               <a:rPr lang="en-CH" smtClean="0"/>
-              <a:t>12/04/2021</a:t>
+              <a:t>13/05/2021</a:t>
             </a:fld>
             <a:endParaRPr lang="en-CH"/>
           </a:p>
@@ -1147,7 +1147,7 @@
           <a:p>
             <a:fld id="{DDDFC78A-5EB4-44A8-B23F-AC4819FE4B6D}" type="datetimeFigureOut">
               <a:rPr lang="en-CH" smtClean="0"/>
-              <a:t>12/04/2021</a:t>
+              <a:t>13/05/2021</a:t>
             </a:fld>
             <a:endParaRPr lang="en-CH"/>
           </a:p>
@@ -1415,7 +1415,7 @@
           <a:p>
             <a:fld id="{DDDFC78A-5EB4-44A8-B23F-AC4819FE4B6D}" type="datetimeFigureOut">
               <a:rPr lang="en-CH" smtClean="0"/>
-              <a:t>12/04/2021</a:t>
+              <a:t>13/05/2021</a:t>
             </a:fld>
             <a:endParaRPr lang="en-CH"/>
           </a:p>
@@ -1830,7 +1830,7 @@
           <a:p>
             <a:fld id="{DDDFC78A-5EB4-44A8-B23F-AC4819FE4B6D}" type="datetimeFigureOut">
               <a:rPr lang="en-CH" smtClean="0"/>
-              <a:t>12/04/2021</a:t>
+              <a:t>13/05/2021</a:t>
             </a:fld>
             <a:endParaRPr lang="en-CH"/>
           </a:p>
@@ -1972,7 +1972,7 @@
           <a:p>
             <a:fld id="{DDDFC78A-5EB4-44A8-B23F-AC4819FE4B6D}" type="datetimeFigureOut">
               <a:rPr lang="en-CH" smtClean="0"/>
-              <a:t>12/04/2021</a:t>
+              <a:t>13/05/2021</a:t>
             </a:fld>
             <a:endParaRPr lang="en-CH"/>
           </a:p>
@@ -2085,7 +2085,7 @@
           <a:p>
             <a:fld id="{DDDFC78A-5EB4-44A8-B23F-AC4819FE4B6D}" type="datetimeFigureOut">
               <a:rPr lang="en-CH" smtClean="0"/>
-              <a:t>12/04/2021</a:t>
+              <a:t>13/05/2021</a:t>
             </a:fld>
             <a:endParaRPr lang="en-CH"/>
           </a:p>
@@ -2398,7 +2398,7 @@
           <a:p>
             <a:fld id="{DDDFC78A-5EB4-44A8-B23F-AC4819FE4B6D}" type="datetimeFigureOut">
               <a:rPr lang="en-CH" smtClean="0"/>
-              <a:t>12/04/2021</a:t>
+              <a:t>13/05/2021</a:t>
             </a:fld>
             <a:endParaRPr lang="en-CH"/>
           </a:p>
@@ -2687,7 +2687,7 @@
           <a:p>
             <a:fld id="{DDDFC78A-5EB4-44A8-B23F-AC4819FE4B6D}" type="datetimeFigureOut">
               <a:rPr lang="en-CH" smtClean="0"/>
-              <a:t>12/04/2021</a:t>
+              <a:t>13/05/2021</a:t>
             </a:fld>
             <a:endParaRPr lang="en-CH"/>
           </a:p>
@@ -2930,7 +2930,7 @@
           <a:p>
             <a:fld id="{DDDFC78A-5EB4-44A8-B23F-AC4819FE4B6D}" type="datetimeFigureOut">
               <a:rPr lang="en-CH" smtClean="0"/>
-              <a:t>12/04/2021</a:t>
+              <a:t>13/05/2021</a:t>
             </a:fld>
             <a:endParaRPr lang="en-CH"/>
           </a:p>
@@ -3361,10 +3361,10 @@
         </p:nvGrpSpPr>
         <p:grpSpPr>
           <a:xfrm>
-            <a:off x="608404" y="548896"/>
-            <a:ext cx="10885745" cy="3242053"/>
-            <a:chOff x="608405" y="479373"/>
-            <a:chExt cx="7944344" cy="2366029"/>
+            <a:off x="608404" y="834181"/>
+            <a:ext cx="10885745" cy="2956768"/>
+            <a:chOff x="608405" y="687572"/>
+            <a:chExt cx="7944344" cy="2157830"/>
           </a:xfrm>
         </p:grpSpPr>
         <p:pic>
@@ -3434,8 +3434,8 @@
           </p:blipFill>
           <p:spPr>
             <a:xfrm>
-              <a:off x="4703777" y="479373"/>
-              <a:ext cx="586435" cy="990600"/>
+              <a:off x="4999879" y="687572"/>
+              <a:ext cx="463182" cy="782401"/>
             </a:xfrm>
             <a:prstGeom prst="rect">
               <a:avLst/>
@@ -3829,8 +3829,8 @@
         </p:nvSpPr>
         <p:spPr>
           <a:xfrm>
-            <a:off x="1311357" y="4095949"/>
-            <a:ext cx="2674546" cy="400110"/>
+            <a:off x="1293324" y="4095949"/>
+            <a:ext cx="2674546" cy="707886"/>
           </a:xfrm>
           <a:prstGeom prst="rect">
             <a:avLst/>
@@ -3843,9 +3843,17 @@
           </a:bodyPr>
           <a:lstStyle/>
           <a:p>
+            <a:pPr algn="ctr"/>
+            <a:r>
+              <a:rPr lang="en-US" sz="2000" b="1" dirty="0"/>
+              <a:t>Client</a:t>
+            </a:r>
+          </a:p>
+          <a:p>
+            <a:pPr algn="ctr"/>
             <a:r>
               <a:rPr lang="en-US" sz="2000" dirty="0"/>
-              <a:t>Client - Desktop/Mobile</a:t>
+              <a:t>Desktop/Mobile</a:t>
             </a:r>
             <a:endParaRPr lang="en-CH" sz="2000" dirty="0"/>
           </a:p>
@@ -3865,8 +3873,8 @@
         </p:nvSpPr>
         <p:spPr>
           <a:xfrm>
-            <a:off x="5983244" y="4088828"/>
-            <a:ext cx="1277260" cy="400110"/>
+            <a:off x="5983242" y="4095949"/>
+            <a:ext cx="1277260" cy="707886"/>
           </a:xfrm>
           <a:prstGeom prst="rect">
             <a:avLst/>
@@ -3881,8 +3889,15 @@
           <a:p>
             <a:pPr algn="ctr"/>
             <a:r>
+              <a:rPr lang="en-US" sz="2000" b="1" dirty="0"/>
+              <a:t>Server</a:t>
+            </a:r>
+          </a:p>
+          <a:p>
+            <a:pPr algn="ctr"/>
+            <a:r>
               <a:rPr lang="en-US" sz="2000" dirty="0"/>
-              <a:t>Server</a:t>
+              <a:t>Tomcat</a:t>
             </a:r>
             <a:endParaRPr lang="en-CH" sz="2000" dirty="0"/>
           </a:p>
@@ -3902,8 +3917,8 @@
         </p:nvSpPr>
         <p:spPr>
           <a:xfrm>
-            <a:off x="9997680" y="4095949"/>
-            <a:ext cx="1423399" cy="400110"/>
+            <a:off x="9856059" y="4095949"/>
+            <a:ext cx="1706640" cy="707886"/>
           </a:xfrm>
           <a:prstGeom prst="rect">
             <a:avLst/>
@@ -3918,13 +3933,93 @@
           <a:p>
             <a:pPr algn="ctr"/>
             <a:r>
-              <a:rPr lang="en-US" sz="2000" dirty="0" err="1"/>
+              <a:rPr lang="en-US" sz="2000" b="1" dirty="0" err="1"/>
               <a:t>Datenbank</a:t>
             </a:r>
+            <a:endParaRPr lang="en-US" sz="2000" b="1" dirty="0"/>
+          </a:p>
+          <a:p>
+            <a:pPr algn="ctr"/>
+            <a:r>
+              <a:rPr lang="en-US" sz="2000" dirty="0"/>
+              <a:t>PostgreSQL</a:t>
+            </a:r>
             <a:endParaRPr lang="en-CH" sz="2000" dirty="0"/>
           </a:p>
         </p:txBody>
       </p:sp>
+      <p:pic>
+        <p:nvPicPr>
+          <p:cNvPr id="3" name="Picture 2" descr="Logo, icon&#10;&#10;Description automatically generated">
+            <a:extLst>
+              <a:ext uri="{FF2B5EF4-FFF2-40B4-BE49-F238E27FC236}">
+                <a16:creationId xmlns:a16="http://schemas.microsoft.com/office/drawing/2014/main" id="{BCC316A2-470F-4827-921C-0C53FA544B42}"/>
+              </a:ext>
+            </a:extLst>
+          </p:cNvPr>
+          <p:cNvPicPr>
+            <a:picLocks noChangeAspect="1"/>
+          </p:cNvPicPr>
+          <p:nvPr/>
+        </p:nvPicPr>
+        <p:blipFill>
+          <a:blip r:embed="rId13">
+            <a:extLst>
+              <a:ext uri="{28A0092B-C50C-407E-A947-70E740481C1C}">
+                <a14:useLocalDpi xmlns:a14="http://schemas.microsoft.com/office/drawing/2010/main" val="0"/>
+              </a:ext>
+            </a:extLst>
+          </a:blip>
+          <a:stretch>
+            <a:fillRect/>
+          </a:stretch>
+        </p:blipFill>
+        <p:spPr>
+          <a:xfrm>
+            <a:off x="10279772" y="989215"/>
+            <a:ext cx="741186" cy="764246"/>
+          </a:xfrm>
+          <a:prstGeom prst="rect">
+            <a:avLst/>
+          </a:prstGeom>
+        </p:spPr>
+      </p:pic>
+      <p:pic>
+        <p:nvPicPr>
+          <p:cNvPr id="6" name="Picture 5" descr="Icon&#10;&#10;Description automatically generated">
+            <a:extLst>
+              <a:ext uri="{FF2B5EF4-FFF2-40B4-BE49-F238E27FC236}">
+                <a16:creationId xmlns:a16="http://schemas.microsoft.com/office/drawing/2014/main" id="{C052944C-CA69-42A9-82A7-9711D2FF6A59}"/>
+              </a:ext>
+            </a:extLst>
+          </p:cNvPr>
+          <p:cNvPicPr>
+            <a:picLocks noChangeAspect="1"/>
+          </p:cNvPicPr>
+          <p:nvPr/>
+        </p:nvPicPr>
+        <p:blipFill>
+          <a:blip r:embed="rId14">
+            <a:extLst>
+              <a:ext uri="{28A0092B-C50C-407E-A947-70E740481C1C}">
+                <a14:useLocalDpi xmlns:a14="http://schemas.microsoft.com/office/drawing/2010/main" val="0"/>
+              </a:ext>
+            </a:extLst>
+          </a:blip>
+          <a:stretch>
+            <a:fillRect/>
+          </a:stretch>
+        </p:blipFill>
+        <p:spPr>
+          <a:xfrm>
+            <a:off x="5852077" y="1215610"/>
+            <a:ext cx="769795" cy="690657"/>
+          </a:xfrm>
+          <a:prstGeom prst="rect">
+            <a:avLst/>
+          </a:prstGeom>
+        </p:spPr>
+      </p:pic>
     </p:spTree>
     <p:extLst>
       <p:ext uri="{BB962C8B-B14F-4D97-AF65-F5344CB8AC3E}">

</xml_diff>